<commit_message>
pointcloud in complex geometri
</commit_message>
<xml_diff>
--- a/presentation/Particles, Sprites, and the Point Cloud.pptx
+++ b/presentation/Particles, Sprites, and the Point Cloud.pptx
@@ -486,7 +486,7 @@
             <a:fld id="{B61BEF0D-F0BB-DE4B-95CE-6DB70DBA9567}" type="datetimeFigureOut">
               <a:rPr lang="en-US" smtClean="0"/>
               <a:pPr/>
-              <a:t>12/3/2019</a:t>
+              <a:t>12/4/2019</a:t>
             </a:fld>
             <a:endParaRPr lang="en-US" dirty="0"/>
           </a:p>
@@ -735,7 +735,7 @@
             <a:fld id="{B61BEF0D-F0BB-DE4B-95CE-6DB70DBA9567}" type="datetimeFigureOut">
               <a:rPr lang="en-US" smtClean="0"/>
               <a:pPr/>
-              <a:t>12/3/2019</a:t>
+              <a:t>12/4/2019</a:t>
             </a:fld>
             <a:endParaRPr lang="en-US" dirty="0"/>
           </a:p>
@@ -1123,7 +1123,7 @@
             <a:fld id="{B61BEF0D-F0BB-DE4B-95CE-6DB70DBA9567}" type="datetimeFigureOut">
               <a:rPr lang="en-US" smtClean="0"/>
               <a:pPr/>
-              <a:t>12/3/2019</a:t>
+              <a:t>12/4/2019</a:t>
             </a:fld>
             <a:endParaRPr lang="en-US" dirty="0"/>
           </a:p>
@@ -1354,7 +1354,7 @@
             <a:fld id="{B61BEF0D-F0BB-DE4B-95CE-6DB70DBA9567}" type="datetimeFigureOut">
               <a:rPr lang="en-US" smtClean="0"/>
               <a:pPr/>
-              <a:t>12/3/2019</a:t>
+              <a:t>12/4/2019</a:t>
             </a:fld>
             <a:endParaRPr lang="en-US" dirty="0"/>
           </a:p>
@@ -1847,7 +1847,7 @@
             <a:fld id="{B61BEF0D-F0BB-DE4B-95CE-6DB70DBA9567}" type="datetimeFigureOut">
               <a:rPr lang="en-US" smtClean="0"/>
               <a:pPr/>
-              <a:t>12/3/2019</a:t>
+              <a:t>12/4/2019</a:t>
             </a:fld>
             <a:endParaRPr lang="en-US" dirty="0"/>
           </a:p>
@@ -2159,7 +2159,7 @@
             <a:fld id="{B61BEF0D-F0BB-DE4B-95CE-6DB70DBA9567}" type="datetimeFigureOut">
               <a:rPr lang="en-US" smtClean="0"/>
               <a:pPr/>
-              <a:t>12/3/2019</a:t>
+              <a:t>12/4/2019</a:t>
             </a:fld>
             <a:endParaRPr lang="en-US" dirty="0"/>
           </a:p>
@@ -2552,7 +2552,7 @@
             <a:fld id="{B61BEF0D-F0BB-DE4B-95CE-6DB70DBA9567}" type="datetimeFigureOut">
               <a:rPr lang="en-US" smtClean="0"/>
               <a:pPr/>
-              <a:t>12/3/2019</a:t>
+              <a:t>12/4/2019</a:t>
             </a:fld>
             <a:endParaRPr lang="en-US" dirty="0"/>
           </a:p>
@@ -2672,7 +2672,7 @@
             <a:fld id="{B61BEF0D-F0BB-DE4B-95CE-6DB70DBA9567}" type="datetimeFigureOut">
               <a:rPr lang="en-US" smtClean="0"/>
               <a:pPr/>
-              <a:t>12/3/2019</a:t>
+              <a:t>12/4/2019</a:t>
             </a:fld>
             <a:endParaRPr lang="en-US" dirty="0"/>
           </a:p>
@@ -2769,7 +2769,7 @@
             <a:fld id="{B61BEF0D-F0BB-DE4B-95CE-6DB70DBA9567}" type="datetimeFigureOut">
               <a:rPr lang="en-US" smtClean="0"/>
               <a:pPr/>
-              <a:t>12/3/2019</a:t>
+              <a:t>12/4/2019</a:t>
             </a:fld>
             <a:endParaRPr lang="en-US" dirty="0"/>
           </a:p>
@@ -3071,7 +3071,7 @@
             <a:fld id="{B61BEF0D-F0BB-DE4B-95CE-6DB70DBA9567}" type="datetimeFigureOut">
               <a:rPr lang="en-US" smtClean="0"/>
               <a:pPr/>
-              <a:t>12/3/2019</a:t>
+              <a:t>12/4/2019</a:t>
             </a:fld>
             <a:endParaRPr lang="en-US" dirty="0"/>
           </a:p>
@@ -3338,7 +3338,7 @@
             <a:fld id="{B61BEF0D-F0BB-DE4B-95CE-6DB70DBA9567}" type="datetimeFigureOut">
               <a:rPr lang="en-US" smtClean="0"/>
               <a:pPr/>
-              <a:t>12/3/2019</a:t>
+              <a:t>12/4/2019</a:t>
             </a:fld>
             <a:endParaRPr lang="en-US" dirty="0"/>
           </a:p>
@@ -3758,7 +3758,7 @@
             <a:fld id="{B61BEF0D-F0BB-DE4B-95CE-6DB70DBA9567}" type="datetimeFigureOut">
               <a:rPr lang="en-US" smtClean="0"/>
               <a:pPr/>
-              <a:t>12/3/2019</a:t>
+              <a:t>12/4/2019</a:t>
             </a:fld>
             <a:endParaRPr lang="en-US" dirty="0"/>
           </a:p>
@@ -4314,11 +4314,7 @@
             <a:pPr algn="l"/>
             <a:r>
               <a:rPr lang="id-ID" dirty="0" smtClean="0"/>
-              <a:t>Patrick </a:t>
-            </a:r>
-            <a:r>
-              <a:rPr lang="id-ID" dirty="0" smtClean="0"/>
-              <a:t>Sungk</a:t>
+              <a:t>Patrick Sungk</a:t>
             </a:r>
             <a:r>
               <a:rPr lang="en-US" dirty="0" smtClean="0"/>
@@ -4326,11 +4322,7 @@
             </a:r>
             <a:r>
               <a:rPr lang="id-ID" dirty="0" smtClean="0"/>
-              <a:t>arisma</a:t>
-            </a:r>
-            <a:r>
-              <a:rPr lang="id-ID" dirty="0" smtClean="0"/>
-              <a:t>				05111740000041</a:t>
+              <a:t>arisma				05111740000041</a:t>
             </a:r>
           </a:p>
           <a:p>
@@ -4824,12 +4816,20 @@
           <a:lstStyle/>
           <a:p>
             <a:r>
+              <a:rPr lang="id-ID" dirty="0" err="1"/>
+              <a:t>C</a:t>
+            </a:r>
+            <a:r>
               <a:rPr lang="en-US" dirty="0" err="1" smtClean="0"/>
-              <a:t>Kriteria</a:t>
+              <a:t>riteria</a:t>
             </a:r>
             <a:r>
               <a:rPr lang="en-US" dirty="0" smtClean="0"/>
-              <a:t> Texture</a:t>
+              <a:t> </a:t>
+            </a:r>
+            <a:r>
+              <a:rPr lang="en-US" dirty="0" smtClean="0"/>
+              <a:t>Texture</a:t>
             </a:r>
             <a:br>
               <a:rPr lang="en-US" dirty="0" smtClean="0"/>
@@ -5409,29 +5409,62 @@
         </p:nvSpPr>
         <p:spPr/>
         <p:txBody>
+          <a:bodyPr>
+            <a:noAutofit/>
+          </a:bodyPr>
+          <a:lstStyle/>
+          <a:p>
+            <a:r>
+              <a:rPr lang="en-US" sz="4800" dirty="0"/>
+              <a:t>Creating THREE</a:t>
+            </a:r>
+            <a:r>
+              <a:rPr lang="en-US" sz="4800" dirty="0" smtClean="0"/>
+              <a:t>.</a:t>
+            </a:r>
+            <a:r>
+              <a:rPr lang="id-ID" sz="4800" dirty="0" smtClean="0"/>
+              <a:t/>
+            </a:r>
+            <a:br>
+              <a:rPr lang="id-ID" sz="4800" dirty="0" smtClean="0"/>
+            </a:br>
+            <a:r>
+              <a:rPr lang="en-US" sz="4800" dirty="0" err="1" smtClean="0"/>
+              <a:t>PointCloud</a:t>
+            </a:r>
+            <a:r>
+              <a:rPr lang="en-US" sz="4800" dirty="0" smtClean="0"/>
+              <a:t> </a:t>
+            </a:r>
+            <a:r>
+              <a:rPr lang="en-US" sz="4800" dirty="0"/>
+              <a:t>from an advanced geometry </a:t>
+            </a:r>
+            <a:endParaRPr lang="en-US" sz="4800" dirty="0"/>
+          </a:p>
+        </p:txBody>
+      </p:sp>
+      <p:sp>
+        <p:nvSpPr>
+          <p:cNvPr id="3" name="Content Placeholder 2"/>
+          <p:cNvSpPr>
+            <a:spLocks noGrp="1"/>
+          </p:cNvSpPr>
+          <p:nvPr>
+            <p:ph idx="1"/>
+          </p:nvPr>
+        </p:nvSpPr>
+        <p:spPr/>
+        <p:txBody>
           <a:bodyPr/>
           <a:lstStyle/>
           <a:p>
-            <a:endParaRPr lang="en-US"/>
-          </a:p>
-        </p:txBody>
-      </p:sp>
-      <p:sp>
-        <p:nvSpPr>
-          <p:cNvPr id="3" name="Content Placeholder 2"/>
-          <p:cNvSpPr>
-            <a:spLocks noGrp="1"/>
-          </p:cNvSpPr>
-          <p:nvPr>
-            <p:ph idx="1"/>
-          </p:nvPr>
-        </p:nvSpPr>
-        <p:spPr/>
-        <p:txBody>
-          <a:bodyPr/>
-          <a:lstStyle/>
-          <a:p>
-            <a:endParaRPr lang="en-US"/>
+            <a:r>
+              <a:rPr lang="id-ID" dirty="0" smtClean="0"/>
+              <a:t>THREE.PointCloud merender setiap partikel berdasarkan dari geometri yang telah disediakan. Sehingga dengan demikian kita dapat menggunakan complex geometri dengan THREE.PointCloud</a:t>
+            </a:r>
+            <a:endParaRPr lang="en-US" dirty="0"/>
           </a:p>
         </p:txBody>
       </p:sp>

</xml_diff>